<commit_message>
Tweaking slides, adding Julia's architecture model
</commit_message>
<xml_diff>
--- a/Presentations/DLF 2015/draftSlides.pptx
+++ b/Presentations/DLF 2015/draftSlides.pptx
@@ -8,13 +8,14 @@
     <p:sldId id="256" r:id="rId2"/>
     <p:sldId id="257" r:id="rId3"/>
     <p:sldId id="258" r:id="rId4"/>
-    <p:sldId id="259" r:id="rId5"/>
-    <p:sldId id="260" r:id="rId6"/>
-    <p:sldId id="261" r:id="rId7"/>
-    <p:sldId id="262" r:id="rId8"/>
-    <p:sldId id="264" r:id="rId9"/>
-    <p:sldId id="265" r:id="rId10"/>
-    <p:sldId id="263" r:id="rId11"/>
+    <p:sldId id="261" r:id="rId5"/>
+    <p:sldId id="266" r:id="rId6"/>
+    <p:sldId id="259" r:id="rId7"/>
+    <p:sldId id="260" r:id="rId8"/>
+    <p:sldId id="262" r:id="rId9"/>
+    <p:sldId id="264" r:id="rId10"/>
+    <p:sldId id="265" r:id="rId11"/>
+    <p:sldId id="263" r:id="rId12"/>
   </p:sldIdLst>
   <p:sldSz cx="9144000" cy="6858000" type="screen4x3"/>
   <p:notesSz cx="6858000" cy="9144000"/>
@@ -335,7 +336,7 @@
           <a:p>
             <a:fld id="{5E586189-2788-254D-A94D-FBB89AEDFCCF}" type="datetimeFigureOut">
               <a:rPr lang="en-US" smtClean="0"/>
-              <a:t>9/30/15</a:t>
+              <a:t>10/1/15</a:t>
             </a:fld>
             <a:endParaRPr lang="en-US"/>
           </a:p>
@@ -656,7 +657,7 @@
           <a:p>
             <a:fld id="{5E586189-2788-254D-A94D-FBB89AEDFCCF}" type="datetimeFigureOut">
               <a:rPr lang="en-US" smtClean="0"/>
-              <a:t>9/30/15</a:t>
+              <a:t>10/1/15</a:t>
             </a:fld>
             <a:endParaRPr lang="en-US"/>
           </a:p>
@@ -933,7 +934,7 @@
           <a:p>
             <a:fld id="{5E586189-2788-254D-A94D-FBB89AEDFCCF}" type="datetimeFigureOut">
               <a:rPr lang="en-US" smtClean="0"/>
-              <a:t>9/30/15</a:t>
+              <a:t>10/1/15</a:t>
             </a:fld>
             <a:endParaRPr lang="en-US"/>
           </a:p>
@@ -1227,7 +1228,7 @@
           <a:p>
             <a:fld id="{5E586189-2788-254D-A94D-FBB89AEDFCCF}" type="datetimeFigureOut">
               <a:rPr lang="en-US" smtClean="0"/>
-              <a:t>9/30/15</a:t>
+              <a:t>10/1/15</a:t>
             </a:fld>
             <a:endParaRPr lang="en-US"/>
           </a:p>
@@ -1556,7 +1557,7 @@
           <a:p>
             <a:fld id="{5E586189-2788-254D-A94D-FBB89AEDFCCF}" type="datetimeFigureOut">
               <a:rPr lang="en-US" smtClean="0"/>
-              <a:t>9/30/15</a:t>
+              <a:t>10/1/15</a:t>
             </a:fld>
             <a:endParaRPr lang="en-US"/>
           </a:p>
@@ -1807,7 +1808,7 @@
           <a:p>
             <a:fld id="{5E586189-2788-254D-A94D-FBB89AEDFCCF}" type="datetimeFigureOut">
               <a:rPr lang="en-US" smtClean="0"/>
-              <a:t>9/30/15</a:t>
+              <a:t>10/1/15</a:t>
             </a:fld>
             <a:endParaRPr lang="en-US"/>
           </a:p>
@@ -1986,7 +1987,7 @@
           <a:p>
             <a:fld id="{5E586189-2788-254D-A94D-FBB89AEDFCCF}" type="datetimeFigureOut">
               <a:rPr lang="en-US" smtClean="0"/>
-              <a:t>9/30/15</a:t>
+              <a:t>10/1/15</a:t>
             </a:fld>
             <a:endParaRPr lang="en-US"/>
           </a:p>
@@ -2155,7 +2156,7 @@
           <a:p>
             <a:fld id="{5E586189-2788-254D-A94D-FBB89AEDFCCF}" type="datetimeFigureOut">
               <a:rPr lang="en-US" smtClean="0"/>
-              <a:t>9/30/15</a:t>
+              <a:t>10/1/15</a:t>
             </a:fld>
             <a:endParaRPr lang="en-US"/>
           </a:p>
@@ -2424,7 +2425,7 @@
           <a:p>
             <a:fld id="{5E586189-2788-254D-A94D-FBB89AEDFCCF}" type="datetimeFigureOut">
               <a:rPr lang="en-US" smtClean="0"/>
-              <a:t>9/30/15</a:t>
+              <a:t>10/1/15</a:t>
             </a:fld>
             <a:endParaRPr lang="en-US"/>
           </a:p>
@@ -2731,7 +2732,7 @@
           <a:p>
             <a:fld id="{5E586189-2788-254D-A94D-FBB89AEDFCCF}" type="datetimeFigureOut">
               <a:rPr lang="en-US" smtClean="0"/>
-              <a:t>9/30/15</a:t>
+              <a:t>10/1/15</a:t>
             </a:fld>
             <a:endParaRPr lang="en-US"/>
           </a:p>
@@ -3023,7 +3024,7 @@
           <a:p>
             <a:fld id="{5E586189-2788-254D-A94D-FBB89AEDFCCF}" type="datetimeFigureOut">
               <a:rPr lang="en-US" smtClean="0"/>
-              <a:t>9/30/15</a:t>
+              <a:t>10/1/15</a:t>
             </a:fld>
             <a:endParaRPr lang="en-US"/>
           </a:p>
@@ -3453,7 +3454,7 @@
           <a:p>
             <a:fld id="{5E586189-2788-254D-A94D-FBB89AEDFCCF}" type="datetimeFigureOut">
               <a:rPr lang="en-US" smtClean="0"/>
-              <a:t>9/30/15</a:t>
+              <a:t>10/1/15</a:t>
             </a:fld>
             <a:endParaRPr lang="en-US"/>
           </a:p>
@@ -3799,7 +3800,7 @@
           <a:p>
             <a:fld id="{5E586189-2788-254D-A94D-FBB89AEDFCCF}" type="datetimeFigureOut">
               <a:rPr lang="en-US" smtClean="0"/>
-              <a:t>9/30/15</a:t>
+              <a:t>10/1/15</a:t>
             </a:fld>
             <a:endParaRPr lang="en-US"/>
           </a:p>
@@ -3889,7 +3890,7 @@
           <a:p>
             <a:fld id="{5E586189-2788-254D-A94D-FBB89AEDFCCF}" type="datetimeFigureOut">
               <a:rPr lang="en-US" smtClean="0"/>
-              <a:t>9/30/15</a:t>
+              <a:t>10/1/15</a:t>
             </a:fld>
             <a:endParaRPr lang="en-US"/>
           </a:p>
@@ -4226,7 +4227,7 @@
           <a:p>
             <a:fld id="{5E586189-2788-254D-A94D-FBB89AEDFCCF}" type="datetimeFigureOut">
               <a:rPr lang="en-US" smtClean="0"/>
-              <a:t>9/30/15</a:t>
+              <a:t>10/1/15</a:t>
             </a:fld>
             <a:endParaRPr lang="en-US"/>
           </a:p>
@@ -4439,7 +4440,7 @@
           <a:p>
             <a:fld id="{5E586189-2788-254D-A94D-FBB89AEDFCCF}" type="datetimeFigureOut">
               <a:rPr lang="en-US" smtClean="0"/>
-              <a:t>9/30/15</a:t>
+              <a:t>10/1/15</a:t>
             </a:fld>
             <a:endParaRPr lang="en-US"/>
           </a:p>
@@ -5070,6 +5071,138 @@
       </p:grpSpPr>
       <p:sp>
         <p:nvSpPr>
+          <p:cNvPr id="5" name="Title 4"/>
+          <p:cNvSpPr>
+            <a:spLocks noGrp="1"/>
+          </p:cNvSpPr>
+          <p:nvPr>
+            <p:ph type="title"/>
+          </p:nvPr>
+        </p:nvSpPr>
+        <p:spPr/>
+        <p:txBody>
+          <a:bodyPr/>
+          <a:lstStyle/>
+          <a:p>
+            <a:r>
+              <a:rPr lang="en-US" dirty="0" smtClean="0"/>
+              <a:t>The Projects</a:t>
+            </a:r>
+            <a:endParaRPr lang="en-US" dirty="0"/>
+          </a:p>
+        </p:txBody>
+      </p:sp>
+      <p:sp>
+        <p:nvSpPr>
+          <p:cNvPr id="6" name="Content Placeholder 5"/>
+          <p:cNvSpPr>
+            <a:spLocks noGrp="1"/>
+          </p:cNvSpPr>
+          <p:nvPr>
+            <p:ph idx="1"/>
+          </p:nvPr>
+        </p:nvSpPr>
+        <p:spPr/>
+        <p:txBody>
+          <a:bodyPr>
+            <a:normAutofit fontScale="92500" lnSpcReduction="10000"/>
+          </a:bodyPr>
+          <a:lstStyle/>
+          <a:p>
+            <a:r>
+              <a:rPr lang="en-US" dirty="0" smtClean="0"/>
+              <a:t>Student Work Showcase (</a:t>
+            </a:r>
+            <a:r>
+              <a:rPr lang="en-US" dirty="0"/>
+              <a:t>Digital Media Commons </a:t>
+            </a:r>
+            <a:r>
+              <a:rPr lang="en-US" dirty="0" smtClean="0"/>
+              <a:t>Studios)</a:t>
+            </a:r>
+          </a:p>
+          <a:p>
+            <a:r>
+              <a:rPr lang="en-US" dirty="0" smtClean="0"/>
+              <a:t>Boston Public Schools Desegregation Exhibit (</a:t>
+            </a:r>
+            <a:r>
+              <a:rPr lang="en-US" dirty="0"/>
+              <a:t>Archives and Special </a:t>
+            </a:r>
+            <a:r>
+              <a:rPr lang="en-US" dirty="0" smtClean="0"/>
+              <a:t>Collections)</a:t>
+            </a:r>
+          </a:p>
+          <a:p>
+            <a:r>
+              <a:rPr lang="en-US" dirty="0" smtClean="0"/>
+              <a:t>Holocaust Awareness Week Programming Exhibit (Holocaust Awareness Committee)</a:t>
+            </a:r>
+          </a:p>
+          <a:p>
+            <a:r>
+              <a:rPr lang="en-US" dirty="0" smtClean="0"/>
+              <a:t>Picturing the World Gallery (University Libraries)</a:t>
+            </a:r>
+          </a:p>
+          <a:p>
+            <a:r>
+              <a:rPr lang="en-US" dirty="0" smtClean="0"/>
+              <a:t>Interviews with Latin American Artists (Stephen </a:t>
+            </a:r>
+            <a:r>
+              <a:rPr lang="en-US" dirty="0" err="1" smtClean="0"/>
+              <a:t>Sadow</a:t>
+            </a:r>
+            <a:r>
+              <a:rPr lang="en-US" dirty="0" smtClean="0"/>
+              <a:t>)</a:t>
+            </a:r>
+          </a:p>
+          <a:p>
+            <a:r>
+              <a:rPr lang="en-US" dirty="0" smtClean="0"/>
+              <a:t>Catskills Institute (Phil Brown)</a:t>
+            </a:r>
+            <a:endParaRPr lang="en-US" dirty="0"/>
+          </a:p>
+        </p:txBody>
+      </p:sp>
+    </p:spTree>
+    <p:extLst>
+      <p:ext uri="{BB962C8B-B14F-4D97-AF65-F5344CB8AC3E}">
+        <p14:creationId xmlns:p14="http://schemas.microsoft.com/office/powerpoint/2010/main" val="3858394262"/>
+      </p:ext>
+    </p:extLst>
+  </p:cSld>
+  <p:clrMapOvr>
+    <a:masterClrMapping/>
+  </p:clrMapOvr>
+</p:sld>
+</file>
+
+<file path=ppt/slides/slide11.xml><?xml version="1.0" encoding="utf-8"?>
+<p:sld xmlns:a="http://schemas.openxmlformats.org/drawingml/2006/main" xmlns:r="http://schemas.openxmlformats.org/officeDocument/2006/relationships" xmlns:p="http://schemas.openxmlformats.org/presentationml/2006/main">
+  <p:cSld>
+    <p:spTree>
+      <p:nvGrpSpPr>
+        <p:cNvPr id="1" name=""/>
+        <p:cNvGrpSpPr/>
+        <p:nvPr/>
+      </p:nvGrpSpPr>
+      <p:grpSpPr>
+        <a:xfrm>
+          <a:off x="0" y="0"/>
+          <a:ext cx="0" cy="0"/>
+          <a:chOff x="0" y="0"/>
+          <a:chExt cx="0" cy="0"/>
+        </a:xfrm>
+      </p:grpSpPr>
+      <p:sp>
+        <p:nvSpPr>
           <p:cNvPr id="2" name="Title 1"/>
           <p:cNvSpPr>
             <a:spLocks noGrp="1"/>
@@ -5433,6 +5566,13 @@
   <p:clrMapOvr>
     <a:masterClrMapping/>
   </p:clrMapOvr>
+  <p:timing>
+    <p:tnLst>
+      <p:par>
+        <p:cTn xmlns:p14="http://schemas.microsoft.com/office/powerpoint/2010/main" id="1" dur="indefinite" restart="never" nodeType="tmRoot"/>
+      </p:par>
+    </p:tnLst>
+  </p:timing>
 </p:sld>
 </file>
 
@@ -5551,17 +5691,22 @@
               </a:spcBef>
             </a:pPr>
             <a:r>
+              <a:rPr lang="en-US" dirty="0" err="1" smtClean="0"/>
+              <a:t>Param</a:t>
+            </a:r>
+            <a:r>
               <a:rPr lang="en-US" dirty="0" smtClean="0"/>
-              <a:t>Param </a:t>
-            </a:r>
-            <a:r>
-              <a:rPr lang="en-US" dirty="0" err="1"/>
+              <a:t> </a:t>
+            </a:r>
+            <a:r>
+              <a:rPr lang="en-US" dirty="0" err="1" smtClean="0"/>
               <a:t>Ajmera</a:t>
             </a:r>
             <a:r>
-              <a:rPr lang="en-US" dirty="0"/>
-              <a:t> - </a:t>
-            </a:r>
+              <a:rPr lang="en-US" dirty="0" smtClean="0"/>
+              <a:t>, </a:t>
+            </a:r>
+            <a:endParaRPr lang="en-US" dirty="0"/>
           </a:p>
           <a:p>
             <a:pPr>
@@ -5572,7 +5717,15 @@
             </a:pPr>
             <a:r>
               <a:rPr lang="en-US" dirty="0"/>
-              <a:t>David Cliff - Senior Digital Library Developer</a:t>
+              <a:t>David </a:t>
+            </a:r>
+            <a:r>
+              <a:rPr lang="en-US" dirty="0" smtClean="0"/>
+              <a:t>Cliff,  </a:t>
+            </a:r>
+            <a:r>
+              <a:rPr lang="en-US" dirty="0"/>
+              <a:t>Senior Digital Library Developer</a:t>
             </a:r>
           </a:p>
           <a:p>
@@ -5583,8 +5736,13 @@
             </a:pPr>
             <a:r>
               <a:rPr lang="en-US" dirty="0"/>
-              <a:t>Dave Decamp - </a:t>
-            </a:r>
+              <a:t>Dave </a:t>
+            </a:r>
+            <a:r>
+              <a:rPr lang="en-US" dirty="0" smtClean="0"/>
+              <a:t>Decamp, </a:t>
+            </a:r>
+            <a:endParaRPr lang="en-US" dirty="0"/>
           </a:p>
           <a:p>
             <a:pPr>
@@ -5594,7 +5752,15 @@
             </a:pPr>
             <a:r>
               <a:rPr lang="en-US" dirty="0"/>
-              <a:t>Julia Flanders - Director, Digital Scholarship Group</a:t>
+              <a:t>Julia </a:t>
+            </a:r>
+            <a:r>
+              <a:rPr lang="en-US" dirty="0" smtClean="0"/>
+              <a:t>Flanders, </a:t>
+            </a:r>
+            <a:r>
+              <a:rPr lang="en-US" dirty="0"/>
+              <a:t>Director, Digital Scholarship Group</a:t>
             </a:r>
           </a:p>
           <a:p>
@@ -5609,7 +5775,15 @@
             </a:r>
             <a:r>
               <a:rPr lang="en-US" dirty="0"/>
-              <a:t> Levesque - DSG Coordinator</a:t>
+              <a:t> </a:t>
+            </a:r>
+            <a:r>
+              <a:rPr lang="en-US" dirty="0" smtClean="0"/>
+              <a:t>Levesque, </a:t>
+            </a:r>
+            <a:r>
+              <a:rPr lang="en-US" dirty="0"/>
+              <a:t>DSG Coordinator</a:t>
             </a:r>
           </a:p>
           <a:p>
@@ -5620,7 +5794,23 @@
             </a:pPr>
             <a:r>
               <a:rPr lang="en-US" dirty="0"/>
-              <a:t>Jim McGrath - DSG Coordinator</a:t>
+              <a:t>Jim </a:t>
+            </a:r>
+            <a:r>
+              <a:rPr lang="en-US" dirty="0" smtClean="0"/>
+              <a:t>McGrath,</a:t>
+            </a:r>
+            <a:r>
+              <a:rPr lang="en-US" dirty="0"/>
+              <a:t> </a:t>
+            </a:r>
+            <a:r>
+              <a:rPr lang="en-US" dirty="0" smtClean="0"/>
+              <a:t> </a:t>
+            </a:r>
+            <a:r>
+              <a:rPr lang="en-US" dirty="0"/>
+              <a:t>DSG Coordinator</a:t>
             </a:r>
           </a:p>
           <a:p>
@@ -5631,8 +5821,13 @@
             </a:pPr>
             <a:r>
               <a:rPr lang="en-US" dirty="0"/>
-              <a:t>Greg Palermo - </a:t>
-            </a:r>
+              <a:t>Greg </a:t>
+            </a:r>
+            <a:r>
+              <a:rPr lang="en-US" dirty="0" smtClean="0"/>
+              <a:t>Palermo, </a:t>
+            </a:r>
+            <a:endParaRPr lang="en-US" dirty="0"/>
           </a:p>
           <a:p>
             <a:pPr>
@@ -5642,7 +5837,15 @@
             </a:pPr>
             <a:r>
               <a:rPr lang="en-US" dirty="0"/>
-              <a:t>Amanda Rust - Assistant Director, Digital Scholarship Group</a:t>
+              <a:t>Amanda </a:t>
+            </a:r>
+            <a:r>
+              <a:rPr lang="en-US" dirty="0" smtClean="0"/>
+              <a:t>Rust, </a:t>
+            </a:r>
+            <a:r>
+              <a:rPr lang="en-US" dirty="0"/>
+              <a:t>Assistant Director, Digital Scholarship Group</a:t>
             </a:r>
           </a:p>
           <a:p>
@@ -5653,7 +5856,15 @@
             </a:pPr>
             <a:r>
               <a:rPr lang="en-US" dirty="0"/>
-              <a:t>Sarah Sweeney - Digital Repository Manager</a:t>
+              <a:t>Sarah </a:t>
+            </a:r>
+            <a:r>
+              <a:rPr lang="en-US" dirty="0" smtClean="0"/>
+              <a:t>Sweeney, </a:t>
+            </a:r>
+            <a:r>
+              <a:rPr lang="en-US" dirty="0"/>
+              <a:t>Digital Repository Manager</a:t>
             </a:r>
           </a:p>
           <a:p>
@@ -5664,7 +5875,15 @@
             </a:pPr>
             <a:r>
               <a:rPr lang="en-US" dirty="0"/>
-              <a:t>Patrick Yott - Associate Dean, Digital Strategies and Services</a:t>
+              <a:t>Patrick </a:t>
+            </a:r>
+            <a:r>
+              <a:rPr lang="en-US" dirty="0" smtClean="0"/>
+              <a:t>Yott, </a:t>
+            </a:r>
+            <a:r>
+              <a:rPr lang="en-US" dirty="0"/>
+              <a:t>Associate Dean, Digital Strategies and Services</a:t>
             </a:r>
           </a:p>
           <a:p>
@@ -5678,12 +5897,20 @@
               <a:t>Eli </a:t>
             </a:r>
             <a:r>
-              <a:rPr lang="en-US" dirty="0" err="1"/>
+              <a:rPr lang="en-US" dirty="0" err="1" smtClean="0"/>
               <a:t>Zoller</a:t>
             </a:r>
             <a:r>
               <a:rPr lang="en-US" dirty="0"/>
-              <a:t> - Web Developer and Designer</a:t>
+              <a:t>,</a:t>
+            </a:r>
+            <a:r>
+              <a:rPr lang="en-US" dirty="0" smtClean="0"/>
+              <a:t> </a:t>
+            </a:r>
+            <a:r>
+              <a:rPr lang="en-US" dirty="0"/>
+              <a:t>Web Developer and Designer</a:t>
             </a:r>
           </a:p>
           <a:p>
@@ -5701,6 +5928,13 @@
   <p:clrMapOvr>
     <a:masterClrMapping/>
   </p:clrMapOvr>
+  <p:timing>
+    <p:tnLst>
+      <p:par>
+        <p:cTn xmlns:p14="http://schemas.microsoft.com/office/powerpoint/2010/main" id="1" dur="indefinite" restart="never" nodeType="tmRoot"/>
+      </p:par>
+    </p:tnLst>
+  </p:timing>
 </p:sld>
 </file>
 
@@ -5723,6 +5957,213 @@
       </p:grpSpPr>
       <p:sp>
         <p:nvSpPr>
+          <p:cNvPr id="2" name="Title 1"/>
+          <p:cNvSpPr>
+            <a:spLocks noGrp="1"/>
+          </p:cNvSpPr>
+          <p:nvPr>
+            <p:ph type="title"/>
+          </p:nvPr>
+        </p:nvSpPr>
+        <p:spPr/>
+        <p:txBody>
+          <a:bodyPr/>
+          <a:lstStyle/>
+          <a:p>
+            <a:r>
+              <a:rPr lang="en-US" dirty="0" smtClean="0"/>
+              <a:t>DRS Project Toolkit Goals</a:t>
+            </a:r>
+            <a:endParaRPr lang="en-US" dirty="0"/>
+          </a:p>
+        </p:txBody>
+      </p:sp>
+      <p:sp>
+        <p:nvSpPr>
+          <p:cNvPr id="3" name="Content Placeholder 2"/>
+          <p:cNvSpPr>
+            <a:spLocks noGrp="1"/>
+          </p:cNvSpPr>
+          <p:nvPr>
+            <p:ph idx="1"/>
+          </p:nvPr>
+        </p:nvSpPr>
+        <p:spPr/>
+        <p:txBody>
+          <a:bodyPr/>
+          <a:lstStyle/>
+          <a:p>
+            <a:r>
+              <a:rPr lang="en-US" dirty="0"/>
+              <a:t>To provide a lightweight and sustainable model for preserving and displaying/distributing project materials.</a:t>
+            </a:r>
+          </a:p>
+          <a:p>
+            <a:r>
+              <a:rPr lang="en-US" dirty="0"/>
+              <a:t>To provide Northeastern projects with a low-barrier customized website to share project work.</a:t>
+            </a:r>
+          </a:p>
+          <a:p>
+            <a:r>
+              <a:rPr lang="en-US" dirty="0"/>
+              <a:t>To support Northeastern projects by preserving project materials in the DRS.</a:t>
+            </a:r>
+          </a:p>
+          <a:p>
+            <a:r>
+              <a:rPr lang="en-US" dirty="0"/>
+              <a:t>To encourage collaborative development between sites (part of sustainability?</a:t>
+            </a:r>
+            <a:r>
+              <a:rPr lang="en-US" dirty="0" smtClean="0"/>
+              <a:t>)</a:t>
+            </a:r>
+            <a:endParaRPr lang="en-US" dirty="0"/>
+          </a:p>
+        </p:txBody>
+      </p:sp>
+    </p:spTree>
+    <p:extLst>
+      <p:ext uri="{BB962C8B-B14F-4D97-AF65-F5344CB8AC3E}">
+        <p14:creationId xmlns:p14="http://schemas.microsoft.com/office/powerpoint/2010/main" val="1518145537"/>
+      </p:ext>
+    </p:extLst>
+  </p:cSld>
+  <p:clrMapOvr>
+    <a:masterClrMapping/>
+  </p:clrMapOvr>
+</p:sld>
+</file>
+
+<file path=ppt/slides/slide5.xml><?xml version="1.0" encoding="utf-8"?>
+<p:sld xmlns:a="http://schemas.openxmlformats.org/drawingml/2006/main" xmlns:r="http://schemas.openxmlformats.org/officeDocument/2006/relationships" xmlns:p="http://schemas.openxmlformats.org/presentationml/2006/main">
+  <p:cSld>
+    <p:spTree>
+      <p:nvGrpSpPr>
+        <p:cNvPr id="1" name=""/>
+        <p:cNvGrpSpPr/>
+        <p:nvPr/>
+      </p:nvGrpSpPr>
+      <p:grpSpPr>
+        <a:xfrm>
+          <a:off x="0" y="0"/>
+          <a:ext cx="0" cy="0"/>
+          <a:chOff x="0" y="0"/>
+          <a:chExt cx="0" cy="0"/>
+        </a:xfrm>
+      </p:grpSpPr>
+      <p:sp>
+        <p:nvSpPr>
+          <p:cNvPr id="2" name="Title 1"/>
+          <p:cNvSpPr>
+            <a:spLocks noGrp="1"/>
+          </p:cNvSpPr>
+          <p:nvPr>
+            <p:ph type="title"/>
+          </p:nvPr>
+        </p:nvSpPr>
+        <p:spPr/>
+        <p:txBody>
+          <a:bodyPr/>
+          <a:lstStyle/>
+          <a:p>
+            <a:endParaRPr lang="en-US"/>
+          </a:p>
+        </p:txBody>
+      </p:sp>
+      <p:pic>
+        <p:nvPicPr>
+          <p:cNvPr id="4" name="Picture 3" descr="2015-10-01_0733.png"/>
+          <p:cNvPicPr>
+            <a:picLocks noChangeAspect="1"/>
+          </p:cNvPicPr>
+          <p:nvPr/>
+        </p:nvPicPr>
+        <p:blipFill>
+          <a:blip r:embed="rId2">
+            <a:extLst>
+              <a:ext uri="{28A0092B-C50C-407E-A947-70E740481C1C}">
+                <a14:useLocalDpi xmlns:a14="http://schemas.microsoft.com/office/drawing/2010/main" val="0"/>
+              </a:ext>
+            </a:extLst>
+          </a:blip>
+          <a:stretch>
+            <a:fillRect/>
+          </a:stretch>
+        </p:blipFill>
+        <p:spPr>
+          <a:xfrm>
+            <a:off x="0" y="939800"/>
+            <a:ext cx="9144000" cy="4969031"/>
+          </a:xfrm>
+          <a:prstGeom prst="rect">
+            <a:avLst/>
+          </a:prstGeom>
+        </p:spPr>
+      </p:pic>
+      <p:sp>
+        <p:nvSpPr>
+          <p:cNvPr id="5" name="TextBox 4"/>
+          <p:cNvSpPr txBox="1"/>
+          <p:nvPr/>
+        </p:nvSpPr>
+        <p:spPr>
+          <a:xfrm>
+            <a:off x="6276238" y="6061315"/>
+            <a:ext cx="2637575" cy="369332"/>
+          </a:xfrm>
+          <a:prstGeom prst="rect">
+            <a:avLst/>
+          </a:prstGeom>
+          <a:noFill/>
+        </p:spPr>
+        <p:txBody>
+          <a:bodyPr wrap="square" rtlCol="0">
+            <a:spAutoFit/>
+          </a:bodyPr>
+          <a:lstStyle/>
+          <a:p>
+            <a:r>
+              <a:rPr lang="en-US" dirty="0" smtClean="0"/>
+              <a:t>Credit: J. Flanders</a:t>
+            </a:r>
+            <a:endParaRPr lang="en-US" dirty="0"/>
+          </a:p>
+        </p:txBody>
+      </p:sp>
+    </p:spTree>
+    <p:extLst>
+      <p:ext uri="{BB962C8B-B14F-4D97-AF65-F5344CB8AC3E}">
+        <p14:creationId xmlns:p14="http://schemas.microsoft.com/office/powerpoint/2010/main" val="63720859"/>
+      </p:ext>
+    </p:extLst>
+  </p:cSld>
+  <p:clrMapOvr>
+    <a:masterClrMapping/>
+  </p:clrMapOvr>
+</p:sld>
+</file>
+
+<file path=ppt/slides/slide6.xml><?xml version="1.0" encoding="utf-8"?>
+<p:sld xmlns:a="http://schemas.openxmlformats.org/drawingml/2006/main" xmlns:r="http://schemas.openxmlformats.org/officeDocument/2006/relationships" xmlns:p="http://schemas.openxmlformats.org/presentationml/2006/main">
+  <p:cSld>
+    <p:spTree>
+      <p:nvGrpSpPr>
+        <p:cNvPr id="1" name=""/>
+        <p:cNvGrpSpPr/>
+        <p:nvPr/>
+      </p:nvGrpSpPr>
+      <p:grpSpPr>
+        <a:xfrm>
+          <a:off x="0" y="0"/>
+          <a:ext cx="0" cy="0"/>
+          <a:chOff x="0" y="0"/>
+          <a:chExt cx="0" cy="0"/>
+        </a:xfrm>
+      </p:grpSpPr>
+      <p:sp>
+        <p:nvSpPr>
           <p:cNvPr id="14" name="Title 13"/>
           <p:cNvSpPr>
             <a:spLocks noGrp="1"/>
@@ -5754,14 +6195,14 @@
             <p:ph idx="1"/>
             <p:extLst>
               <p:ext uri="{D42A27DB-BD31-4B8C-83A1-F6EECF244321}">
-                <p14:modId xmlns:p14="http://schemas.microsoft.com/office/powerpoint/2010/main" val="839937392"/>
+                <p14:modId xmlns:p14="http://schemas.microsoft.com/office/powerpoint/2010/main" val="169015061"/>
               </p:ext>
             </p:extLst>
           </p:nvPr>
         </p:nvGraphicFramePr>
         <p:xfrm>
           <a:off x="1114425" y="2318803"/>
-          <a:ext cx="7349974" cy="4348480"/>
+          <a:ext cx="7349974" cy="3977640"/>
         </p:xfrm>
         <a:graphic>
           <a:graphicData uri="http://schemas.openxmlformats.org/drawingml/2006/table">
@@ -5781,7 +6222,11 @@
                     <a:p>
                       <a:r>
                         <a:rPr lang="en-US" dirty="0" smtClean="0"/>
-                        <a:t>September 30, 2014</a:t>
+                        <a:t>October </a:t>
+                      </a:r>
+                      <a:r>
+                        <a:rPr lang="en-US" dirty="0" smtClean="0"/>
+                        <a:t>2014</a:t>
                       </a:r>
                     </a:p>
                   </a:txBody>
@@ -5812,68 +6257,6 @@
                       <a:r>
                         <a:rPr lang="en-US" dirty="0" smtClean="0"/>
                         <a:t>Toolkit planning begins</a:t>
-                      </a:r>
-                    </a:p>
-                  </a:txBody>
-                  <a:tcPr/>
-                </a:tc>
-              </a:tr>
-              <a:tr h="370840">
-                <a:tc>
-                  <a:txBody>
-                    <a:bodyPr/>
-                    <a:lstStyle/>
-                    <a:p>
-                      <a:pPr marL="0" marR="0" indent="0" algn="l" defTabSz="914400" rtl="0" eaLnBrk="1" fontAlgn="auto" latinLnBrk="0" hangingPunct="1">
-                        <a:lnSpc>
-                          <a:spcPct val="100000"/>
-                        </a:lnSpc>
-                        <a:spcBef>
-                          <a:spcPts val="0"/>
-                        </a:spcBef>
-                        <a:spcAft>
-                          <a:spcPts val="0"/>
-                        </a:spcAft>
-                        <a:buClrTx/>
-                        <a:buSzTx/>
-                        <a:buFontTx/>
-                        <a:buNone/>
-                        <a:tabLst/>
-                        <a:defRPr/>
-                      </a:pPr>
-                      <a:r>
-                        <a:rPr lang="en-US" dirty="0" smtClean="0"/>
-                        <a:t>October 2014</a:t>
-                      </a:r>
-                    </a:p>
-                  </a:txBody>
-                  <a:tcPr/>
-                </a:tc>
-                <a:tc>
-                  <a:txBody>
-                    <a:bodyPr/>
-                    <a:lstStyle/>
-                    <a:p>
-                      <a:pPr marL="0" marR="0" indent="0" algn="l" defTabSz="914400" rtl="0" eaLnBrk="1" fontAlgn="auto" latinLnBrk="0" hangingPunct="1">
-                        <a:lnSpc>
-                          <a:spcPct val="100000"/>
-                        </a:lnSpc>
-                        <a:spcBef>
-                          <a:spcPts val="0"/>
-                        </a:spcBef>
-                        <a:spcAft>
-                          <a:spcPts val="0"/>
-                        </a:spcAft>
-                        <a:buClrTx/>
-                        <a:buSzTx/>
-                        <a:buFontTx/>
-                        <a:buNone/>
-                        <a:tabLst/>
-                        <a:defRPr/>
-                      </a:pPr>
-                      <a:r>
-                        <a:rPr lang="en-US" dirty="0" smtClean="0"/>
-                        <a:t>DRS Soft Launch</a:t>
                       </a:r>
                     </a:p>
                   </a:txBody>
@@ -6401,10 +6784,17 @@
   <p:clrMapOvr>
     <a:masterClrMapping/>
   </p:clrMapOvr>
+  <p:timing>
+    <p:tnLst>
+      <p:par>
+        <p:cTn xmlns:p14="http://schemas.microsoft.com/office/powerpoint/2010/main" id="1" dur="indefinite" restart="never" nodeType="tmRoot"/>
+      </p:par>
+    </p:tnLst>
+  </p:timing>
 </p:sld>
 </file>
 
-<file path=ppt/slides/slide5.xml><?xml version="1.0" encoding="utf-8"?>
+<file path=ppt/slides/slide7.xml><?xml version="1.0" encoding="utf-8"?>
 <p:sld xmlns:a="http://schemas.openxmlformats.org/drawingml/2006/main" xmlns:r="http://schemas.openxmlformats.org/officeDocument/2006/relationships" xmlns:p="http://schemas.openxmlformats.org/presentationml/2006/main">
   <p:cSld>
     <p:spTree>
@@ -6642,7 +7032,7 @@
 </p:sld>
 </file>
 
-<file path=ppt/slides/slide6.xml><?xml version="1.0" encoding="utf-8"?>
+<file path=ppt/slides/slide8.xml><?xml version="1.0" encoding="utf-8"?>
 <p:sld xmlns:a="http://schemas.openxmlformats.org/drawingml/2006/main" xmlns:r="http://schemas.openxmlformats.org/officeDocument/2006/relationships" xmlns:p="http://schemas.openxmlformats.org/presentationml/2006/main">
   <p:cSld>
     <p:spTree>
@@ -6676,104 +7066,6 @@
           <a:p>
             <a:r>
               <a:rPr lang="en-US" dirty="0" smtClean="0"/>
-              <a:t>DRS Project Toolkit Goals</a:t>
-            </a:r>
-            <a:endParaRPr lang="en-US" dirty="0"/>
-          </a:p>
-        </p:txBody>
-      </p:sp>
-      <p:sp>
-        <p:nvSpPr>
-          <p:cNvPr id="3" name="Content Placeholder 2"/>
-          <p:cNvSpPr>
-            <a:spLocks noGrp="1"/>
-          </p:cNvSpPr>
-          <p:nvPr>
-            <p:ph idx="1"/>
-          </p:nvPr>
-        </p:nvSpPr>
-        <p:spPr/>
-        <p:txBody>
-          <a:bodyPr/>
-          <a:lstStyle/>
-          <a:p>
-            <a:r>
-              <a:rPr lang="en-US" dirty="0"/>
-              <a:t>To provide a lightweight and sustainable model for preserving and displaying/distributing project materials.</a:t>
-            </a:r>
-          </a:p>
-          <a:p>
-            <a:r>
-              <a:rPr lang="en-US" dirty="0"/>
-              <a:t>To provide Northeastern projects with a low-barrier customized website to share project work.</a:t>
-            </a:r>
-          </a:p>
-          <a:p>
-            <a:r>
-              <a:rPr lang="en-US" dirty="0"/>
-              <a:t>To support Northeastern projects by preserving project materials in the DRS.</a:t>
-            </a:r>
-          </a:p>
-          <a:p>
-            <a:r>
-              <a:rPr lang="en-US" dirty="0"/>
-              <a:t>To encourage collaborative development between sites (part of sustainability?</a:t>
-            </a:r>
-            <a:r>
-              <a:rPr lang="en-US" dirty="0" smtClean="0"/>
-              <a:t>)</a:t>
-            </a:r>
-            <a:endParaRPr lang="en-US" dirty="0"/>
-          </a:p>
-        </p:txBody>
-      </p:sp>
-    </p:spTree>
-    <p:extLst>
-      <p:ext uri="{BB962C8B-B14F-4D97-AF65-F5344CB8AC3E}">
-        <p14:creationId xmlns:p14="http://schemas.microsoft.com/office/powerpoint/2010/main" val="1518145537"/>
-      </p:ext>
-    </p:extLst>
-  </p:cSld>
-  <p:clrMapOvr>
-    <a:masterClrMapping/>
-  </p:clrMapOvr>
-</p:sld>
-</file>
-
-<file path=ppt/slides/slide7.xml><?xml version="1.0" encoding="utf-8"?>
-<p:sld xmlns:a="http://schemas.openxmlformats.org/drawingml/2006/main" xmlns:r="http://schemas.openxmlformats.org/officeDocument/2006/relationships" xmlns:p="http://schemas.openxmlformats.org/presentationml/2006/main">
-  <p:cSld>
-    <p:spTree>
-      <p:nvGrpSpPr>
-        <p:cNvPr id="1" name=""/>
-        <p:cNvGrpSpPr/>
-        <p:nvPr/>
-      </p:nvGrpSpPr>
-      <p:grpSpPr>
-        <a:xfrm>
-          <a:off x="0" y="0"/>
-          <a:ext cx="0" cy="0"/>
-          <a:chOff x="0" y="0"/>
-          <a:chExt cx="0" cy="0"/>
-        </a:xfrm>
-      </p:grpSpPr>
-      <p:sp>
-        <p:nvSpPr>
-          <p:cNvPr id="2" name="Title 1"/>
-          <p:cNvSpPr>
-            <a:spLocks noGrp="1"/>
-          </p:cNvSpPr>
-          <p:nvPr>
-            <p:ph type="title"/>
-          </p:nvPr>
-        </p:nvSpPr>
-        <p:spPr/>
-        <p:txBody>
-          <a:bodyPr/>
-          <a:lstStyle/>
-          <a:p>
-            <a:r>
-              <a:rPr lang="en-US" dirty="0" smtClean="0"/>
               <a:t>DRS Project Toolkit Pilot Planning</a:t>
             </a:r>
             <a:endParaRPr lang="en-US" dirty="0"/>
@@ -6998,7 +7290,7 @@
 </p:sld>
 </file>
 
-<file path=ppt/slides/slide8.xml><?xml version="1.0" encoding="utf-8"?>
+<file path=ppt/slides/slide9.xml><?xml version="1.0" encoding="utf-8"?>
 <p:sld xmlns:a="http://schemas.openxmlformats.org/drawingml/2006/main" xmlns:r="http://schemas.openxmlformats.org/officeDocument/2006/relationships" xmlns:p="http://schemas.openxmlformats.org/presentationml/2006/main">
   <p:cSld>
     <p:spTree>
@@ -7205,138 +7497,6 @@
     <p:extLst>
       <p:ext uri="{BB962C8B-B14F-4D97-AF65-F5344CB8AC3E}">
         <p14:creationId xmlns:p14="http://schemas.microsoft.com/office/powerpoint/2010/main" val="2532566785"/>
-      </p:ext>
-    </p:extLst>
-  </p:cSld>
-  <p:clrMapOvr>
-    <a:masterClrMapping/>
-  </p:clrMapOvr>
-</p:sld>
-</file>
-
-<file path=ppt/slides/slide9.xml><?xml version="1.0" encoding="utf-8"?>
-<p:sld xmlns:a="http://schemas.openxmlformats.org/drawingml/2006/main" xmlns:r="http://schemas.openxmlformats.org/officeDocument/2006/relationships" xmlns:p="http://schemas.openxmlformats.org/presentationml/2006/main">
-  <p:cSld>
-    <p:spTree>
-      <p:nvGrpSpPr>
-        <p:cNvPr id="1" name=""/>
-        <p:cNvGrpSpPr/>
-        <p:nvPr/>
-      </p:nvGrpSpPr>
-      <p:grpSpPr>
-        <a:xfrm>
-          <a:off x="0" y="0"/>
-          <a:ext cx="0" cy="0"/>
-          <a:chOff x="0" y="0"/>
-          <a:chExt cx="0" cy="0"/>
-        </a:xfrm>
-      </p:grpSpPr>
-      <p:sp>
-        <p:nvSpPr>
-          <p:cNvPr id="5" name="Title 4"/>
-          <p:cNvSpPr>
-            <a:spLocks noGrp="1"/>
-          </p:cNvSpPr>
-          <p:nvPr>
-            <p:ph type="title"/>
-          </p:nvPr>
-        </p:nvSpPr>
-        <p:spPr/>
-        <p:txBody>
-          <a:bodyPr/>
-          <a:lstStyle/>
-          <a:p>
-            <a:r>
-              <a:rPr lang="en-US" dirty="0" smtClean="0"/>
-              <a:t>The Projects</a:t>
-            </a:r>
-            <a:endParaRPr lang="en-US" dirty="0"/>
-          </a:p>
-        </p:txBody>
-      </p:sp>
-      <p:sp>
-        <p:nvSpPr>
-          <p:cNvPr id="6" name="Content Placeholder 5"/>
-          <p:cNvSpPr>
-            <a:spLocks noGrp="1"/>
-          </p:cNvSpPr>
-          <p:nvPr>
-            <p:ph idx="1"/>
-          </p:nvPr>
-        </p:nvSpPr>
-        <p:spPr/>
-        <p:txBody>
-          <a:bodyPr>
-            <a:normAutofit fontScale="92500" lnSpcReduction="10000"/>
-          </a:bodyPr>
-          <a:lstStyle/>
-          <a:p>
-            <a:r>
-              <a:rPr lang="en-US" dirty="0" smtClean="0"/>
-              <a:t>Student Work Showcase (</a:t>
-            </a:r>
-            <a:r>
-              <a:rPr lang="en-US" dirty="0"/>
-              <a:t>Digital Media Commons </a:t>
-            </a:r>
-            <a:r>
-              <a:rPr lang="en-US" dirty="0" smtClean="0"/>
-              <a:t>Studios)</a:t>
-            </a:r>
-          </a:p>
-          <a:p>
-            <a:r>
-              <a:rPr lang="en-US" dirty="0" smtClean="0"/>
-              <a:t>Boston Public Schools Desegregation Exhibit (</a:t>
-            </a:r>
-            <a:r>
-              <a:rPr lang="en-US" dirty="0"/>
-              <a:t>Archives and Special </a:t>
-            </a:r>
-            <a:r>
-              <a:rPr lang="en-US" dirty="0" smtClean="0"/>
-              <a:t>Collections)</a:t>
-            </a:r>
-          </a:p>
-          <a:p>
-            <a:r>
-              <a:rPr lang="en-US" dirty="0" smtClean="0"/>
-              <a:t>Holocaust Awareness Week Programming Exhibit (Holocaust Awareness Committee)</a:t>
-            </a:r>
-          </a:p>
-          <a:p>
-            <a:r>
-              <a:rPr lang="en-US" dirty="0" smtClean="0"/>
-              <a:t>Picturing the World Gallery (University Libraries)</a:t>
-            </a:r>
-          </a:p>
-          <a:p>
-            <a:r>
-              <a:rPr lang="en-US" dirty="0" smtClean="0"/>
-              <a:t>Interviews with Latin American Artists (Stephen </a:t>
-            </a:r>
-            <a:r>
-              <a:rPr lang="en-US" dirty="0" err="1" smtClean="0"/>
-              <a:t>Sadow</a:t>
-            </a:r>
-            <a:r>
-              <a:rPr lang="en-US" dirty="0" smtClean="0"/>
-              <a:t>)</a:t>
-            </a:r>
-          </a:p>
-          <a:p>
-            <a:r>
-              <a:rPr lang="en-US" dirty="0" smtClean="0"/>
-              <a:t>Catskills Institute (Phil Brown)</a:t>
-            </a:r>
-            <a:endParaRPr lang="en-US" dirty="0"/>
-          </a:p>
-        </p:txBody>
-      </p:sp>
-    </p:spTree>
-    <p:extLst>
-      <p:ext uri="{BB962C8B-B14F-4D97-AF65-F5344CB8AC3E}">
-        <p14:creationId xmlns:p14="http://schemas.microsoft.com/office/powerpoint/2010/main" val="3858394262"/>
       </p:ext>
     </p:extLst>
   </p:cSld>

</xml_diff>